<commit_message>
Adding actual new version of the hierarchy picture.
git-svn-id: https://svn.nexusformat.org/definitions/trunk@619 e2afd93b-eb5f-4fc1-b239-527b97798288
</commit_message>
<xml_diff>
--- a/manual/img/FileFolderReps_source.pptx
+++ b/manual/img/FileFolderReps_source.pptx
@@ -6,6 +6,7 @@
   </p:sldMasterIdLst>
   <p:sldIdLst>
     <p:sldId id="257" r:id="rId2"/>
+    <p:sldId id="259" r:id="rId3"/>
   </p:sldIdLst>
   <p:sldSz cx="9144000" cy="6858000" type="screen4x3"/>
   <p:notesSz cx="6858000" cy="9144000"/>
@@ -288,7 +289,8 @@
           <a:p>
             <a:fld id="{C60A1D1A-CA8E-0F4C-B399-2279E3AB98BD}" type="datetimeFigureOut">
               <a:rPr lang="en-US" smtClean="0"/>
-              <a:t>10/6/10</a:t>
+              <a:pPr/>
+              <a:t>10/8/10</a:t>
             </a:fld>
             <a:endParaRPr lang="en-US"/>
           </a:p>
@@ -330,6 +332,7 @@
           <a:p>
             <a:fld id="{F6F21AE4-73BD-D244-9222-1FDBCA49ACB7}" type="slidenum">
               <a:rPr lang="en-US" smtClean="0"/>
+              <a:pPr/>
               <a:t>‹#›</a:t>
             </a:fld>
             <a:endParaRPr lang="en-US"/>
@@ -453,7 +456,8 @@
           <a:p>
             <a:fld id="{C60A1D1A-CA8E-0F4C-B399-2279E3AB98BD}" type="datetimeFigureOut">
               <a:rPr lang="en-US" smtClean="0"/>
-              <a:t>10/6/10</a:t>
+              <a:pPr/>
+              <a:t>10/8/10</a:t>
             </a:fld>
             <a:endParaRPr lang="en-US"/>
           </a:p>
@@ -495,6 +499,7 @@
           <a:p>
             <a:fld id="{F6F21AE4-73BD-D244-9222-1FDBCA49ACB7}" type="slidenum">
               <a:rPr lang="en-US" smtClean="0"/>
+              <a:pPr/>
               <a:t>‹#›</a:t>
             </a:fld>
             <a:endParaRPr lang="en-US"/>
@@ -628,7 +633,8 @@
           <a:p>
             <a:fld id="{C60A1D1A-CA8E-0F4C-B399-2279E3AB98BD}" type="datetimeFigureOut">
               <a:rPr lang="en-US" smtClean="0"/>
-              <a:t>10/6/10</a:t>
+              <a:pPr/>
+              <a:t>10/8/10</a:t>
             </a:fld>
             <a:endParaRPr lang="en-US"/>
           </a:p>
@@ -670,6 +676,7 @@
           <a:p>
             <a:fld id="{F6F21AE4-73BD-D244-9222-1FDBCA49ACB7}" type="slidenum">
               <a:rPr lang="en-US" smtClean="0"/>
+              <a:pPr/>
               <a:t>‹#›</a:t>
             </a:fld>
             <a:endParaRPr lang="en-US"/>
@@ -793,7 +800,8 @@
           <a:p>
             <a:fld id="{C60A1D1A-CA8E-0F4C-B399-2279E3AB98BD}" type="datetimeFigureOut">
               <a:rPr lang="en-US" smtClean="0"/>
-              <a:t>10/6/10</a:t>
+              <a:pPr/>
+              <a:t>10/8/10</a:t>
             </a:fld>
             <a:endParaRPr lang="en-US"/>
           </a:p>
@@ -835,6 +843,7 @@
           <a:p>
             <a:fld id="{F6F21AE4-73BD-D244-9222-1FDBCA49ACB7}" type="slidenum">
               <a:rPr lang="en-US" smtClean="0"/>
+              <a:pPr/>
               <a:t>‹#›</a:t>
             </a:fld>
             <a:endParaRPr lang="en-US"/>
@@ -1034,7 +1043,8 @@
           <a:p>
             <a:fld id="{C60A1D1A-CA8E-0F4C-B399-2279E3AB98BD}" type="datetimeFigureOut">
               <a:rPr lang="en-US" smtClean="0"/>
-              <a:t>10/6/10</a:t>
+              <a:pPr/>
+              <a:t>10/8/10</a:t>
             </a:fld>
             <a:endParaRPr lang="en-US"/>
           </a:p>
@@ -1076,6 +1086,7 @@
           <a:p>
             <a:fld id="{F6F21AE4-73BD-D244-9222-1FDBCA49ACB7}" type="slidenum">
               <a:rPr lang="en-US" smtClean="0"/>
+              <a:pPr/>
               <a:t>‹#›</a:t>
             </a:fld>
             <a:endParaRPr lang="en-US"/>
@@ -1317,7 +1328,8 @@
           <a:p>
             <a:fld id="{C60A1D1A-CA8E-0F4C-B399-2279E3AB98BD}" type="datetimeFigureOut">
               <a:rPr lang="en-US" smtClean="0"/>
-              <a:t>10/6/10</a:t>
+              <a:pPr/>
+              <a:t>10/8/10</a:t>
             </a:fld>
             <a:endParaRPr lang="en-US"/>
           </a:p>
@@ -1359,6 +1371,7 @@
           <a:p>
             <a:fld id="{F6F21AE4-73BD-D244-9222-1FDBCA49ACB7}" type="slidenum">
               <a:rPr lang="en-US" smtClean="0"/>
+              <a:pPr/>
               <a:t>‹#›</a:t>
             </a:fld>
             <a:endParaRPr lang="en-US"/>
@@ -1734,7 +1747,8 @@
           <a:p>
             <a:fld id="{C60A1D1A-CA8E-0F4C-B399-2279E3AB98BD}" type="datetimeFigureOut">
               <a:rPr lang="en-US" smtClean="0"/>
-              <a:t>10/6/10</a:t>
+              <a:pPr/>
+              <a:t>10/8/10</a:t>
             </a:fld>
             <a:endParaRPr lang="en-US"/>
           </a:p>
@@ -1776,6 +1790,7 @@
           <a:p>
             <a:fld id="{F6F21AE4-73BD-D244-9222-1FDBCA49ACB7}" type="slidenum">
               <a:rPr lang="en-US" smtClean="0"/>
+              <a:pPr/>
               <a:t>‹#›</a:t>
             </a:fld>
             <a:endParaRPr lang="en-US"/>
@@ -1847,7 +1862,8 @@
           <a:p>
             <a:fld id="{C60A1D1A-CA8E-0F4C-B399-2279E3AB98BD}" type="datetimeFigureOut">
               <a:rPr lang="en-US" smtClean="0"/>
-              <a:t>10/6/10</a:t>
+              <a:pPr/>
+              <a:t>10/8/10</a:t>
             </a:fld>
             <a:endParaRPr lang="en-US"/>
           </a:p>
@@ -1889,6 +1905,7 @@
           <a:p>
             <a:fld id="{F6F21AE4-73BD-D244-9222-1FDBCA49ACB7}" type="slidenum">
               <a:rPr lang="en-US" smtClean="0"/>
+              <a:pPr/>
               <a:t>‹#›</a:t>
             </a:fld>
             <a:endParaRPr lang="en-US"/>
@@ -1937,7 +1954,8 @@
           <a:p>
             <a:fld id="{C60A1D1A-CA8E-0F4C-B399-2279E3AB98BD}" type="datetimeFigureOut">
               <a:rPr lang="en-US" smtClean="0"/>
-              <a:t>10/6/10</a:t>
+              <a:pPr/>
+              <a:t>10/8/10</a:t>
             </a:fld>
             <a:endParaRPr lang="en-US"/>
           </a:p>
@@ -1979,6 +1997,7 @@
           <a:p>
             <a:fld id="{F6F21AE4-73BD-D244-9222-1FDBCA49ACB7}" type="slidenum">
               <a:rPr lang="en-US" smtClean="0"/>
+              <a:pPr/>
               <a:t>‹#›</a:t>
             </a:fld>
             <a:endParaRPr lang="en-US"/>
@@ -2209,7 +2228,8 @@
           <a:p>
             <a:fld id="{C60A1D1A-CA8E-0F4C-B399-2279E3AB98BD}" type="datetimeFigureOut">
               <a:rPr lang="en-US" smtClean="0"/>
-              <a:t>10/6/10</a:t>
+              <a:pPr/>
+              <a:t>10/8/10</a:t>
             </a:fld>
             <a:endParaRPr lang="en-US"/>
           </a:p>
@@ -2251,6 +2271,7 @@
           <a:p>
             <a:fld id="{F6F21AE4-73BD-D244-9222-1FDBCA49ACB7}" type="slidenum">
               <a:rPr lang="en-US" smtClean="0"/>
+              <a:pPr/>
               <a:t>‹#›</a:t>
             </a:fld>
             <a:endParaRPr lang="en-US"/>
@@ -2457,7 +2478,8 @@
           <a:p>
             <a:fld id="{C60A1D1A-CA8E-0F4C-B399-2279E3AB98BD}" type="datetimeFigureOut">
               <a:rPr lang="en-US" smtClean="0"/>
-              <a:t>10/6/10</a:t>
+              <a:pPr/>
+              <a:t>10/8/10</a:t>
             </a:fld>
             <a:endParaRPr lang="en-US"/>
           </a:p>
@@ -2499,6 +2521,7 @@
           <a:p>
             <a:fld id="{F6F21AE4-73BD-D244-9222-1FDBCA49ACB7}" type="slidenum">
               <a:rPr lang="en-US" smtClean="0"/>
+              <a:pPr/>
               <a:t>‹#›</a:t>
             </a:fld>
             <a:endParaRPr lang="en-US"/>
@@ -2665,7 +2688,8 @@
           <a:p>
             <a:fld id="{C60A1D1A-CA8E-0F4C-B399-2279E3AB98BD}" type="datetimeFigureOut">
               <a:rPr lang="en-US" smtClean="0"/>
-              <a:t>10/6/10</a:t>
+              <a:pPr/>
+              <a:t>10/8/10</a:t>
             </a:fld>
             <a:endParaRPr lang="en-US"/>
           </a:p>
@@ -2743,6 +2767,7 @@
           <a:p>
             <a:fld id="{F6F21AE4-73BD-D244-9222-1FDBCA49ACB7}" type="slidenum">
               <a:rPr lang="en-US" smtClean="0"/>
+              <a:pPr/>
               <a:t>‹#›</a:t>
             </a:fld>
             <a:endParaRPr lang="en-US"/>
@@ -3435,6 +3460,1001 @@
           <a:xfrm>
             <a:off x="3070315" y="4707167"/>
             <a:ext cx="724952" cy="1588"/>
+          </a:xfrm>
+          <a:prstGeom prst="line">
+            <a:avLst/>
+          </a:prstGeom>
+        </p:spPr>
+        <p:style>
+          <a:lnRef idx="2">
+            <a:schemeClr val="accent1"/>
+          </a:lnRef>
+          <a:fillRef idx="0">
+            <a:schemeClr val="accent1"/>
+          </a:fillRef>
+          <a:effectRef idx="1">
+            <a:schemeClr val="accent1"/>
+          </a:effectRef>
+          <a:fontRef idx="minor">
+            <a:schemeClr val="tx1"/>
+          </a:fontRef>
+        </p:style>
+      </p:cxnSp>
+    </p:spTree>
+  </p:cSld>
+  <p:clrMapOvr>
+    <a:masterClrMapping/>
+  </p:clrMapOvr>
+</p:sld>
+</file>
+
+<file path=ppt/slides/slide2.xml><?xml version="1.0" encoding="utf-8"?>
+<p:sld xmlns:a="http://schemas.openxmlformats.org/drawingml/2006/main" xmlns:r="http://schemas.openxmlformats.org/officeDocument/2006/relationships" xmlns:mc="http://schemas.openxmlformats.org/markup-compatibility/2006" xmlns:mv="urn:schemas-microsoft-com:mac:vml" xmlns:p="http://schemas.openxmlformats.org/presentationml/2006/main" mc:Ignorable="mv" mc:PreserveAttributes="mv:*">
+  <p:cSld>
+    <p:spTree>
+      <p:nvGrpSpPr>
+        <p:cNvPr id="1" name=""/>
+        <p:cNvGrpSpPr/>
+        <p:nvPr/>
+      </p:nvGrpSpPr>
+      <p:grpSpPr>
+        <a:xfrm>
+          <a:off x="0" y="0"/>
+          <a:ext cx="0" cy="0"/>
+          <a:chOff x="0" y="0"/>
+          <a:chExt cx="0" cy="0"/>
+        </a:xfrm>
+      </p:grpSpPr>
+      <p:pic>
+        <p:nvPicPr>
+          <p:cNvPr id="4" name="Picture 3" descr="113063-glowing-purple-neon-icon-business-folder.png"/>
+          <p:cNvPicPr>
+            <a:picLocks noChangeAspect="1"/>
+          </p:cNvPicPr>
+          <p:nvPr/>
+        </p:nvPicPr>
+        <p:blipFill>
+          <a:blip r:embed="rId2"/>
+          <a:stretch>
+            <a:fillRect/>
+          </a:stretch>
+        </p:blipFill>
+        <p:spPr>
+          <a:xfrm>
+            <a:off x="99282" y="565708"/>
+            <a:ext cx="1100408" cy="1100408"/>
+          </a:xfrm>
+          <a:prstGeom prst="rect">
+            <a:avLst/>
+          </a:prstGeom>
+        </p:spPr>
+      </p:pic>
+      <p:pic>
+        <p:nvPicPr>
+          <p:cNvPr id="5" name="Picture 4" descr="113065-glowing-purple-neon-icon-business-folder2-sc1.png"/>
+          <p:cNvPicPr>
+            <a:picLocks noChangeAspect="1"/>
+          </p:cNvPicPr>
+          <p:nvPr/>
+        </p:nvPicPr>
+        <p:blipFill>
+          <a:blip r:embed="rId3"/>
+          <a:stretch>
+            <a:fillRect/>
+          </a:stretch>
+        </p:blipFill>
+        <p:spPr>
+          <a:xfrm>
+            <a:off x="3495038" y="626977"/>
+            <a:ext cx="1039139" cy="1039139"/>
+          </a:xfrm>
+          <a:prstGeom prst="rect">
+            <a:avLst/>
+          </a:prstGeom>
+        </p:spPr>
+      </p:pic>
+      <p:pic>
+        <p:nvPicPr>
+          <p:cNvPr id="18" name="Picture 17" descr="113044-glowing-purple-neon-icon-business-document3.png"/>
+          <p:cNvPicPr>
+            <a:picLocks noChangeAspect="1"/>
+          </p:cNvPicPr>
+          <p:nvPr/>
+        </p:nvPicPr>
+        <p:blipFill>
+          <a:blip r:embed="rId4"/>
+          <a:stretch>
+            <a:fillRect/>
+          </a:stretch>
+        </p:blipFill>
+        <p:spPr>
+          <a:xfrm>
+            <a:off x="6695557" y="2843509"/>
+            <a:ext cx="806477" cy="806477"/>
+          </a:xfrm>
+          <a:prstGeom prst="rect">
+            <a:avLst/>
+          </a:prstGeom>
+        </p:spPr>
+      </p:pic>
+      <p:pic>
+        <p:nvPicPr>
+          <p:cNvPr id="23" name="Picture 22" descr="113063-glowing-purple-neon-icon-business-folder.png"/>
+          <p:cNvPicPr>
+            <a:picLocks noChangeAspect="1"/>
+          </p:cNvPicPr>
+          <p:nvPr/>
+        </p:nvPicPr>
+        <p:blipFill>
+          <a:blip r:embed="rId2"/>
+          <a:stretch>
+            <a:fillRect/>
+          </a:stretch>
+        </p:blipFill>
+        <p:spPr>
+          <a:xfrm>
+            <a:off x="99282" y="4626951"/>
+            <a:ext cx="1100408" cy="1100408"/>
+          </a:xfrm>
+          <a:prstGeom prst="rect">
+            <a:avLst/>
+          </a:prstGeom>
+        </p:spPr>
+      </p:pic>
+      <p:pic>
+        <p:nvPicPr>
+          <p:cNvPr id="24" name="Picture 23" descr="113065-glowing-purple-neon-icon-business-folder2-sc1.png"/>
+          <p:cNvPicPr>
+            <a:picLocks noChangeAspect="1"/>
+          </p:cNvPicPr>
+          <p:nvPr/>
+        </p:nvPicPr>
+        <p:blipFill>
+          <a:blip r:embed="rId3"/>
+          <a:stretch>
+            <a:fillRect/>
+          </a:stretch>
+        </p:blipFill>
+        <p:spPr>
+          <a:xfrm>
+            <a:off x="3495038" y="5604598"/>
+            <a:ext cx="1039139" cy="1039139"/>
+          </a:xfrm>
+          <a:prstGeom prst="rect">
+            <a:avLst/>
+          </a:prstGeom>
+        </p:spPr>
+      </p:pic>
+      <p:pic>
+        <p:nvPicPr>
+          <p:cNvPr id="25" name="Picture 24" descr="113065-glowing-purple-neon-icon-business-folder2-sc1.png"/>
+          <p:cNvPicPr>
+            <a:picLocks noChangeAspect="1"/>
+          </p:cNvPicPr>
+          <p:nvPr/>
+        </p:nvPicPr>
+        <p:blipFill>
+          <a:blip r:embed="rId3"/>
+          <a:stretch>
+            <a:fillRect/>
+          </a:stretch>
+        </p:blipFill>
+        <p:spPr>
+          <a:xfrm>
+            <a:off x="3495038" y="4688220"/>
+            <a:ext cx="1039139" cy="1039139"/>
+          </a:xfrm>
+          <a:prstGeom prst="rect">
+            <a:avLst/>
+          </a:prstGeom>
+        </p:spPr>
+      </p:pic>
+      <p:pic>
+        <p:nvPicPr>
+          <p:cNvPr id="26" name="Picture 25" descr="113065-glowing-purple-neon-icon-business-folder2-sc1.png"/>
+          <p:cNvPicPr>
+            <a:picLocks noChangeAspect="1"/>
+          </p:cNvPicPr>
+          <p:nvPr/>
+        </p:nvPicPr>
+        <p:blipFill>
+          <a:blip r:embed="rId3"/>
+          <a:stretch>
+            <a:fillRect/>
+          </a:stretch>
+        </p:blipFill>
+        <p:spPr>
+          <a:xfrm>
+            <a:off x="3495038" y="1666116"/>
+            <a:ext cx="1039139" cy="1039139"/>
+          </a:xfrm>
+          <a:prstGeom prst="rect">
+            <a:avLst/>
+          </a:prstGeom>
+        </p:spPr>
+      </p:pic>
+      <p:pic>
+        <p:nvPicPr>
+          <p:cNvPr id="27" name="Picture 26" descr="113065-glowing-purple-neon-icon-business-folder2-sc1.png"/>
+          <p:cNvPicPr>
+            <a:picLocks noChangeAspect="1"/>
+          </p:cNvPicPr>
+          <p:nvPr/>
+        </p:nvPicPr>
+        <p:blipFill>
+          <a:blip r:embed="rId3"/>
+          <a:stretch>
+            <a:fillRect/>
+          </a:stretch>
+        </p:blipFill>
+        <p:spPr>
+          <a:xfrm>
+            <a:off x="3495038" y="2705255"/>
+            <a:ext cx="1039139" cy="1039139"/>
+          </a:xfrm>
+          <a:prstGeom prst="rect">
+            <a:avLst/>
+          </a:prstGeom>
+        </p:spPr>
+      </p:pic>
+      <p:pic>
+        <p:nvPicPr>
+          <p:cNvPr id="28" name="Picture 27" descr="113044-glowing-purple-neon-icon-business-document3.png"/>
+          <p:cNvPicPr>
+            <a:picLocks noChangeAspect="1"/>
+          </p:cNvPicPr>
+          <p:nvPr/>
+        </p:nvPicPr>
+        <p:blipFill>
+          <a:blip r:embed="rId4"/>
+          <a:stretch>
+            <a:fillRect/>
+          </a:stretch>
+        </p:blipFill>
+        <p:spPr>
+          <a:xfrm>
+            <a:off x="6695557" y="3649986"/>
+            <a:ext cx="806477" cy="806477"/>
+          </a:xfrm>
+          <a:prstGeom prst="rect">
+            <a:avLst/>
+          </a:prstGeom>
+        </p:spPr>
+      </p:pic>
+      <p:pic>
+        <p:nvPicPr>
+          <p:cNvPr id="29" name="Picture 28" descr="113044-glowing-purple-neon-icon-business-document3.png"/>
+          <p:cNvPicPr>
+            <a:picLocks noChangeAspect="1"/>
+          </p:cNvPicPr>
+          <p:nvPr/>
+        </p:nvPicPr>
+        <p:blipFill>
+          <a:blip r:embed="rId4"/>
+          <a:stretch>
+            <a:fillRect/>
+          </a:stretch>
+        </p:blipFill>
+        <p:spPr>
+          <a:xfrm>
+            <a:off x="6695557" y="4456463"/>
+            <a:ext cx="806477" cy="806477"/>
+          </a:xfrm>
+          <a:prstGeom prst="rect">
+            <a:avLst/>
+          </a:prstGeom>
+        </p:spPr>
+      </p:pic>
+      <p:pic>
+        <p:nvPicPr>
+          <p:cNvPr id="30" name="Picture 29" descr="113044-glowing-purple-neon-icon-business-document3.png"/>
+          <p:cNvPicPr>
+            <a:picLocks noChangeAspect="1"/>
+          </p:cNvPicPr>
+          <p:nvPr/>
+        </p:nvPicPr>
+        <p:blipFill>
+          <a:blip r:embed="rId4"/>
+          <a:stretch>
+            <a:fillRect/>
+          </a:stretch>
+        </p:blipFill>
+        <p:spPr>
+          <a:xfrm>
+            <a:off x="3495038" y="3820474"/>
+            <a:ext cx="806477" cy="806477"/>
+          </a:xfrm>
+          <a:prstGeom prst="rect">
+            <a:avLst/>
+          </a:prstGeom>
+        </p:spPr>
+      </p:pic>
+      <p:sp>
+        <p:nvSpPr>
+          <p:cNvPr id="31" name="TextBox 30"/>
+          <p:cNvSpPr txBox="1"/>
+          <p:nvPr/>
+        </p:nvSpPr>
+        <p:spPr>
+          <a:xfrm>
+            <a:off x="1051244" y="978084"/>
+            <a:ext cx="2031325" cy="400110"/>
+          </a:xfrm>
+          <a:prstGeom prst="rect">
+            <a:avLst/>
+          </a:prstGeom>
+          <a:noFill/>
+        </p:spPr>
+        <p:txBody>
+          <a:bodyPr wrap="none" rtlCol="0">
+            <a:spAutoFit/>
+          </a:bodyPr>
+          <a:lstStyle/>
+          <a:p>
+            <a:r>
+              <a:rPr lang="en-US" sz="2000" dirty="0" smtClean="0"/>
+              <a:t>Run1101:NXentry</a:t>
+            </a:r>
+            <a:endParaRPr lang="en-US" sz="2000" dirty="0"/>
+          </a:p>
+        </p:txBody>
+      </p:sp>
+      <p:sp>
+        <p:nvSpPr>
+          <p:cNvPr id="32" name="TextBox 31"/>
+          <p:cNvSpPr txBox="1"/>
+          <p:nvPr/>
+        </p:nvSpPr>
+        <p:spPr>
+          <a:xfrm>
+            <a:off x="1042997" y="5053039"/>
+            <a:ext cx="2031325" cy="400110"/>
+          </a:xfrm>
+          <a:prstGeom prst="rect">
+            <a:avLst/>
+          </a:prstGeom>
+          <a:noFill/>
+        </p:spPr>
+        <p:txBody>
+          <a:bodyPr wrap="none" rtlCol="0">
+            <a:spAutoFit/>
+          </a:bodyPr>
+          <a:lstStyle/>
+          <a:p>
+            <a:r>
+              <a:rPr lang="en-US" sz="2000" dirty="0" smtClean="0"/>
+              <a:t>Run1102:NXentry</a:t>
+            </a:r>
+            <a:endParaRPr lang="en-US" sz="2000" dirty="0"/>
+          </a:p>
+        </p:txBody>
+      </p:sp>
+      <p:sp>
+        <p:nvSpPr>
+          <p:cNvPr id="33" name="TextBox 32"/>
+          <p:cNvSpPr txBox="1"/>
+          <p:nvPr/>
+        </p:nvSpPr>
+        <p:spPr>
+          <a:xfrm>
+            <a:off x="4534177" y="961590"/>
+            <a:ext cx="2050536" cy="400110"/>
+          </a:xfrm>
+          <a:prstGeom prst="rect">
+            <a:avLst/>
+          </a:prstGeom>
+          <a:noFill/>
+        </p:spPr>
+        <p:txBody>
+          <a:bodyPr wrap="none" rtlCol="0">
+            <a:spAutoFit/>
+          </a:bodyPr>
+          <a:lstStyle/>
+          <a:p>
+            <a:r>
+              <a:rPr lang="en-US" sz="2000" dirty="0" err="1" smtClean="0"/>
+              <a:t>sample:NXsample</a:t>
+            </a:r>
+            <a:endParaRPr lang="en-US" sz="2000" dirty="0"/>
+          </a:p>
+        </p:txBody>
+      </p:sp>
+      <p:sp>
+        <p:nvSpPr>
+          <p:cNvPr id="34" name="TextBox 33"/>
+          <p:cNvSpPr txBox="1"/>
+          <p:nvPr/>
+        </p:nvSpPr>
+        <p:spPr>
+          <a:xfrm>
+            <a:off x="4534177" y="1989495"/>
+            <a:ext cx="2236510" cy="400110"/>
+          </a:xfrm>
+          <a:prstGeom prst="rect">
+            <a:avLst/>
+          </a:prstGeom>
+          <a:noFill/>
+        </p:spPr>
+        <p:txBody>
+          <a:bodyPr wrap="none" rtlCol="0">
+            <a:spAutoFit/>
+          </a:bodyPr>
+          <a:lstStyle/>
+          <a:p>
+            <a:r>
+              <a:rPr lang="en-US" sz="2000" dirty="0" err="1" smtClean="0"/>
+              <a:t>monitor:NXmonitor</a:t>
+            </a:r>
+            <a:endParaRPr lang="en-US" sz="2000" dirty="0"/>
+          </a:p>
+        </p:txBody>
+      </p:sp>
+      <p:sp>
+        <p:nvSpPr>
+          <p:cNvPr id="17" name="TextBox 16"/>
+          <p:cNvSpPr txBox="1"/>
+          <p:nvPr/>
+        </p:nvSpPr>
+        <p:spPr>
+          <a:xfrm>
+            <a:off x="4534177" y="3006622"/>
+            <a:ext cx="1468195" cy="400110"/>
+          </a:xfrm>
+          <a:prstGeom prst="rect">
+            <a:avLst/>
+          </a:prstGeom>
+          <a:noFill/>
+        </p:spPr>
+        <p:txBody>
+          <a:bodyPr wrap="none" rtlCol="0">
+            <a:spAutoFit/>
+          </a:bodyPr>
+          <a:lstStyle/>
+          <a:p>
+            <a:r>
+              <a:rPr lang="en-US" sz="2000" dirty="0" err="1" smtClean="0"/>
+              <a:t>d</a:t>
+            </a:r>
+            <a:r>
+              <a:rPr lang="en-US" sz="2000" dirty="0" err="1" smtClean="0"/>
+              <a:t>ata:NXdata</a:t>
+            </a:r>
+            <a:endParaRPr lang="en-US" sz="2000" dirty="0"/>
+          </a:p>
+        </p:txBody>
+      </p:sp>
+      <p:sp>
+        <p:nvSpPr>
+          <p:cNvPr id="19" name="TextBox 18"/>
+          <p:cNvSpPr txBox="1"/>
+          <p:nvPr/>
+        </p:nvSpPr>
+        <p:spPr>
+          <a:xfrm>
+            <a:off x="4534177" y="3969792"/>
+            <a:ext cx="1266192" cy="400110"/>
+          </a:xfrm>
+          <a:prstGeom prst="rect">
+            <a:avLst/>
+          </a:prstGeom>
+          <a:noFill/>
+        </p:spPr>
+        <p:txBody>
+          <a:bodyPr wrap="none" rtlCol="0">
+            <a:spAutoFit/>
+          </a:bodyPr>
+          <a:lstStyle/>
+          <a:p>
+            <a:r>
+              <a:rPr lang="en-US" sz="2000" dirty="0" err="1" smtClean="0"/>
+              <a:t>s</a:t>
+            </a:r>
+            <a:r>
+              <a:rPr lang="en-US" sz="2000" dirty="0" err="1" smtClean="0"/>
+              <a:t>tart_time</a:t>
+            </a:r>
+            <a:endParaRPr lang="en-US" sz="2000" dirty="0"/>
+          </a:p>
+        </p:txBody>
+      </p:sp>
+      <p:sp>
+        <p:nvSpPr>
+          <p:cNvPr id="20" name="TextBox 19"/>
+          <p:cNvSpPr txBox="1"/>
+          <p:nvPr/>
+        </p:nvSpPr>
+        <p:spPr>
+          <a:xfrm>
+            <a:off x="4534177" y="4970569"/>
+            <a:ext cx="2050536" cy="400110"/>
+          </a:xfrm>
+          <a:prstGeom prst="rect">
+            <a:avLst/>
+          </a:prstGeom>
+          <a:noFill/>
+        </p:spPr>
+        <p:txBody>
+          <a:bodyPr wrap="none" rtlCol="0">
+            <a:spAutoFit/>
+          </a:bodyPr>
+          <a:lstStyle/>
+          <a:p>
+            <a:r>
+              <a:rPr lang="en-US" sz="2000" dirty="0" err="1" smtClean="0"/>
+              <a:t>s</a:t>
+            </a:r>
+            <a:r>
+              <a:rPr lang="en-US" sz="2000" dirty="0" err="1" smtClean="0"/>
+              <a:t>ample:NXsample</a:t>
+            </a:r>
+            <a:endParaRPr lang="en-US" sz="2000" dirty="0"/>
+          </a:p>
+        </p:txBody>
+      </p:sp>
+      <p:sp>
+        <p:nvSpPr>
+          <p:cNvPr id="21" name="TextBox 20"/>
+          <p:cNvSpPr txBox="1"/>
+          <p:nvPr/>
+        </p:nvSpPr>
+        <p:spPr>
+          <a:xfrm>
+            <a:off x="4534177" y="5851064"/>
+            <a:ext cx="2236510" cy="400110"/>
+          </a:xfrm>
+          <a:prstGeom prst="rect">
+            <a:avLst/>
+          </a:prstGeom>
+          <a:noFill/>
+        </p:spPr>
+        <p:txBody>
+          <a:bodyPr wrap="none" rtlCol="0">
+            <a:spAutoFit/>
+          </a:bodyPr>
+          <a:lstStyle/>
+          <a:p>
+            <a:r>
+              <a:rPr lang="en-US" sz="2000" dirty="0" err="1" smtClean="0"/>
+              <a:t>monitor:NXmonitor</a:t>
+            </a:r>
+            <a:endParaRPr lang="en-US" sz="2000" dirty="0"/>
+          </a:p>
+        </p:txBody>
+      </p:sp>
+      <p:sp>
+        <p:nvSpPr>
+          <p:cNvPr id="22" name="TextBox 21"/>
+          <p:cNvSpPr txBox="1"/>
+          <p:nvPr/>
+        </p:nvSpPr>
+        <p:spPr>
+          <a:xfrm>
+            <a:off x="7403070" y="3041437"/>
+            <a:ext cx="879593" cy="400110"/>
+          </a:xfrm>
+          <a:prstGeom prst="rect">
+            <a:avLst/>
+          </a:prstGeom>
+          <a:noFill/>
+        </p:spPr>
+        <p:txBody>
+          <a:bodyPr wrap="none" rtlCol="0">
+            <a:spAutoFit/>
+          </a:bodyPr>
+          <a:lstStyle/>
+          <a:p>
+            <a:r>
+              <a:rPr lang="en-US" sz="2000" dirty="0" smtClean="0"/>
+              <a:t>counts</a:t>
+            </a:r>
+            <a:endParaRPr lang="en-US" sz="2000" dirty="0"/>
+          </a:p>
+        </p:txBody>
+      </p:sp>
+      <p:sp>
+        <p:nvSpPr>
+          <p:cNvPr id="35" name="TextBox 34"/>
+          <p:cNvSpPr txBox="1"/>
+          <p:nvPr/>
+        </p:nvSpPr>
+        <p:spPr>
+          <a:xfrm>
+            <a:off x="7419564" y="3829475"/>
+            <a:ext cx="1418352" cy="400110"/>
+          </a:xfrm>
+          <a:prstGeom prst="rect">
+            <a:avLst/>
+          </a:prstGeom>
+          <a:noFill/>
+        </p:spPr>
+        <p:txBody>
+          <a:bodyPr wrap="none" rtlCol="0">
+            <a:spAutoFit/>
+          </a:bodyPr>
+          <a:lstStyle/>
+          <a:p>
+            <a:r>
+              <a:rPr lang="en-US" sz="2000" dirty="0" err="1" smtClean="0"/>
+              <a:t>p</a:t>
+            </a:r>
+            <a:r>
+              <a:rPr lang="en-US" sz="2000" dirty="0" err="1" smtClean="0"/>
+              <a:t>olar_angle</a:t>
+            </a:r>
+            <a:endParaRPr lang="en-US" sz="2000" dirty="0"/>
+          </a:p>
+        </p:txBody>
+      </p:sp>
+      <p:sp>
+        <p:nvSpPr>
+          <p:cNvPr id="36" name="TextBox 35"/>
+          <p:cNvSpPr txBox="1"/>
+          <p:nvPr/>
+        </p:nvSpPr>
+        <p:spPr>
+          <a:xfrm>
+            <a:off x="7411317" y="4648492"/>
+            <a:ext cx="973268" cy="400110"/>
+          </a:xfrm>
+          <a:prstGeom prst="rect">
+            <a:avLst/>
+          </a:prstGeom>
+          <a:noFill/>
+        </p:spPr>
+        <p:txBody>
+          <a:bodyPr wrap="none" rtlCol="0">
+            <a:spAutoFit/>
+          </a:bodyPr>
+          <a:lstStyle/>
+          <a:p>
+            <a:r>
+              <a:rPr lang="en-US" sz="2000" dirty="0" smtClean="0"/>
+              <a:t>integral</a:t>
+            </a:r>
+            <a:endParaRPr lang="en-US" sz="2000" dirty="0"/>
+          </a:p>
+        </p:txBody>
+      </p:sp>
+      <p:cxnSp>
+        <p:nvCxnSpPr>
+          <p:cNvPr id="38" name="Straight Connector 37"/>
+          <p:cNvCxnSpPr/>
+          <p:nvPr/>
+        </p:nvCxnSpPr>
+        <p:spPr>
+          <a:xfrm rot="5400000">
+            <a:off x="1431013" y="2981111"/>
+            <a:ext cx="3636709" cy="1588"/>
+          </a:xfrm>
+          <a:prstGeom prst="line">
+            <a:avLst/>
+          </a:prstGeom>
+        </p:spPr>
+        <p:style>
+          <a:lnRef idx="2">
+            <a:schemeClr val="accent1"/>
+          </a:lnRef>
+          <a:fillRef idx="0">
+            <a:schemeClr val="accent1"/>
+          </a:fillRef>
+          <a:effectRef idx="1">
+            <a:schemeClr val="accent1"/>
+          </a:effectRef>
+          <a:fontRef idx="minor">
+            <a:schemeClr val="tx1"/>
+          </a:fontRef>
+        </p:style>
+      </p:cxnSp>
+      <p:cxnSp>
+        <p:nvCxnSpPr>
+          <p:cNvPr id="40" name="Straight Connector 39"/>
+          <p:cNvCxnSpPr/>
+          <p:nvPr/>
+        </p:nvCxnSpPr>
+        <p:spPr>
+          <a:xfrm>
+            <a:off x="3074322" y="1163550"/>
+            <a:ext cx="420716" cy="1588"/>
+          </a:xfrm>
+          <a:prstGeom prst="line">
+            <a:avLst/>
+          </a:prstGeom>
+        </p:spPr>
+        <p:style>
+          <a:lnRef idx="2">
+            <a:schemeClr val="accent1"/>
+          </a:lnRef>
+          <a:fillRef idx="0">
+            <a:schemeClr val="accent1"/>
+          </a:fillRef>
+          <a:effectRef idx="1">
+            <a:schemeClr val="accent1"/>
+          </a:effectRef>
+          <a:fontRef idx="minor">
+            <a:schemeClr val="tx1"/>
+          </a:fontRef>
+        </p:style>
+      </p:cxnSp>
+      <p:cxnSp>
+        <p:nvCxnSpPr>
+          <p:cNvPr id="41" name="Straight Connector 40"/>
+          <p:cNvCxnSpPr/>
+          <p:nvPr/>
+        </p:nvCxnSpPr>
+        <p:spPr>
+          <a:xfrm>
+            <a:off x="3250162" y="2216722"/>
+            <a:ext cx="246465" cy="1588"/>
+          </a:xfrm>
+          <a:prstGeom prst="line">
+            <a:avLst/>
+          </a:prstGeom>
+        </p:spPr>
+        <p:style>
+          <a:lnRef idx="2">
+            <a:schemeClr val="accent1"/>
+          </a:lnRef>
+          <a:fillRef idx="0">
+            <a:schemeClr val="accent1"/>
+          </a:fillRef>
+          <a:effectRef idx="1">
+            <a:schemeClr val="accent1"/>
+          </a:effectRef>
+          <a:fontRef idx="minor">
+            <a:schemeClr val="tx1"/>
+          </a:fontRef>
+        </p:style>
+      </p:cxnSp>
+      <p:cxnSp>
+        <p:nvCxnSpPr>
+          <p:cNvPr id="42" name="Straight Connector 41"/>
+          <p:cNvCxnSpPr/>
+          <p:nvPr/>
+        </p:nvCxnSpPr>
+        <p:spPr>
+          <a:xfrm>
+            <a:off x="3250162" y="3239289"/>
+            <a:ext cx="246465" cy="1588"/>
+          </a:xfrm>
+          <a:prstGeom prst="line">
+            <a:avLst/>
+          </a:prstGeom>
+        </p:spPr>
+        <p:style>
+          <a:lnRef idx="2">
+            <a:schemeClr val="accent1"/>
+          </a:lnRef>
+          <a:fillRef idx="0">
+            <a:schemeClr val="accent1"/>
+          </a:fillRef>
+          <a:effectRef idx="1">
+            <a:schemeClr val="accent1"/>
+          </a:effectRef>
+          <a:fontRef idx="minor">
+            <a:schemeClr val="tx1"/>
+          </a:fontRef>
+        </p:style>
+      </p:cxnSp>
+      <p:cxnSp>
+        <p:nvCxnSpPr>
+          <p:cNvPr id="43" name="Straight Connector 42"/>
+          <p:cNvCxnSpPr/>
+          <p:nvPr/>
+        </p:nvCxnSpPr>
+        <p:spPr>
+          <a:xfrm>
+            <a:off x="3250162" y="4229585"/>
+            <a:ext cx="246465" cy="1588"/>
+          </a:xfrm>
+          <a:prstGeom prst="line">
+            <a:avLst/>
+          </a:prstGeom>
+        </p:spPr>
+        <p:style>
+          <a:lnRef idx="2">
+            <a:schemeClr val="accent1"/>
+          </a:lnRef>
+          <a:fillRef idx="0">
+            <a:schemeClr val="accent1"/>
+          </a:fillRef>
+          <a:effectRef idx="1">
+            <a:schemeClr val="accent1"/>
+          </a:effectRef>
+          <a:fontRef idx="minor">
+            <a:schemeClr val="tx1"/>
+          </a:fontRef>
+        </p:style>
+      </p:cxnSp>
+      <p:cxnSp>
+        <p:nvCxnSpPr>
+          <p:cNvPr id="45" name="Straight Connector 44"/>
+          <p:cNvCxnSpPr/>
+          <p:nvPr/>
+        </p:nvCxnSpPr>
+        <p:spPr>
+          <a:xfrm rot="5400000">
+            <a:off x="2558175" y="5953338"/>
+            <a:ext cx="1380797" cy="1588"/>
+          </a:xfrm>
+          <a:prstGeom prst="line">
+            <a:avLst/>
+          </a:prstGeom>
+        </p:spPr>
+        <p:style>
+          <a:lnRef idx="2">
+            <a:schemeClr val="accent1"/>
+          </a:lnRef>
+          <a:fillRef idx="0">
+            <a:schemeClr val="accent1"/>
+          </a:fillRef>
+          <a:effectRef idx="1">
+            <a:schemeClr val="accent1"/>
+          </a:effectRef>
+          <a:fontRef idx="minor">
+            <a:schemeClr val="tx1"/>
+          </a:fontRef>
+        </p:style>
+      </p:cxnSp>
+      <p:cxnSp>
+        <p:nvCxnSpPr>
+          <p:cNvPr id="46" name="Straight Connector 45"/>
+          <p:cNvCxnSpPr/>
+          <p:nvPr/>
+        </p:nvCxnSpPr>
+        <p:spPr>
+          <a:xfrm>
+            <a:off x="3074322" y="5262940"/>
+            <a:ext cx="419922" cy="3969"/>
+          </a:xfrm>
+          <a:prstGeom prst="line">
+            <a:avLst/>
+          </a:prstGeom>
+        </p:spPr>
+        <p:style>
+          <a:lnRef idx="2">
+            <a:schemeClr val="accent1"/>
+          </a:lnRef>
+          <a:fillRef idx="0">
+            <a:schemeClr val="accent1"/>
+          </a:fillRef>
+          <a:effectRef idx="1">
+            <a:schemeClr val="accent1"/>
+          </a:effectRef>
+          <a:fontRef idx="minor">
+            <a:schemeClr val="tx1"/>
+          </a:fontRef>
+        </p:style>
+      </p:cxnSp>
+      <p:cxnSp>
+        <p:nvCxnSpPr>
+          <p:cNvPr id="47" name="Straight Connector 46"/>
+          <p:cNvCxnSpPr/>
+          <p:nvPr/>
+        </p:nvCxnSpPr>
+        <p:spPr>
+          <a:xfrm>
+            <a:off x="3247779" y="6166800"/>
+            <a:ext cx="246465" cy="1588"/>
+          </a:xfrm>
+          <a:prstGeom prst="line">
+            <a:avLst/>
+          </a:prstGeom>
+        </p:spPr>
+        <p:style>
+          <a:lnRef idx="2">
+            <a:schemeClr val="accent1"/>
+          </a:lnRef>
+          <a:fillRef idx="0">
+            <a:schemeClr val="accent1"/>
+          </a:fillRef>
+          <a:effectRef idx="1">
+            <a:schemeClr val="accent1"/>
+          </a:effectRef>
+          <a:fontRef idx="minor">
+            <a:schemeClr val="tx1"/>
+          </a:fontRef>
+        </p:style>
+      </p:cxnSp>
+      <p:cxnSp>
+        <p:nvCxnSpPr>
+          <p:cNvPr id="49" name="Straight Connector 48"/>
+          <p:cNvCxnSpPr/>
+          <p:nvPr/>
+        </p:nvCxnSpPr>
+        <p:spPr>
+          <a:xfrm rot="16200000" flipH="1">
+            <a:off x="5686705" y="4100805"/>
+            <a:ext cx="1731280" cy="8247"/>
+          </a:xfrm>
+          <a:prstGeom prst="line">
+            <a:avLst/>
+          </a:prstGeom>
+        </p:spPr>
+        <p:style>
+          <a:lnRef idx="2">
+            <a:schemeClr val="accent1"/>
+          </a:lnRef>
+          <a:fillRef idx="0">
+            <a:schemeClr val="accent1"/>
+          </a:fillRef>
+          <a:effectRef idx="1">
+            <a:schemeClr val="accent1"/>
+          </a:effectRef>
+          <a:fontRef idx="minor">
+            <a:schemeClr val="tx1"/>
+          </a:fontRef>
+        </p:style>
+      </p:cxnSp>
+      <p:cxnSp>
+        <p:nvCxnSpPr>
+          <p:cNvPr id="50" name="Straight Connector 49"/>
+          <p:cNvCxnSpPr/>
+          <p:nvPr/>
+        </p:nvCxnSpPr>
+        <p:spPr>
+          <a:xfrm>
+            <a:off x="6002372" y="3244053"/>
+            <a:ext cx="799923" cy="1588"/>
+          </a:xfrm>
+          <a:prstGeom prst="line">
+            <a:avLst/>
+          </a:prstGeom>
+        </p:spPr>
+        <p:style>
+          <a:lnRef idx="2">
+            <a:schemeClr val="accent1"/>
+          </a:lnRef>
+          <a:fillRef idx="0">
+            <a:schemeClr val="accent1"/>
+          </a:fillRef>
+          <a:effectRef idx="1">
+            <a:schemeClr val="accent1"/>
+          </a:effectRef>
+          <a:fontRef idx="minor">
+            <a:schemeClr val="tx1"/>
+          </a:fontRef>
+        </p:style>
+      </p:cxnSp>
+      <p:cxnSp>
+        <p:nvCxnSpPr>
+          <p:cNvPr id="51" name="Straight Connector 50"/>
+          <p:cNvCxnSpPr/>
+          <p:nvPr/>
+        </p:nvCxnSpPr>
+        <p:spPr>
+          <a:xfrm>
+            <a:off x="6548221" y="4113418"/>
+            <a:ext cx="246465" cy="1588"/>
+          </a:xfrm>
+          <a:prstGeom prst="line">
+            <a:avLst/>
+          </a:prstGeom>
+        </p:spPr>
+        <p:style>
+          <a:lnRef idx="2">
+            <a:schemeClr val="accent1"/>
+          </a:lnRef>
+          <a:fillRef idx="0">
+            <a:schemeClr val="accent1"/>
+          </a:fillRef>
+          <a:effectRef idx="1">
+            <a:schemeClr val="accent1"/>
+          </a:effectRef>
+          <a:fontRef idx="minor">
+            <a:schemeClr val="tx1"/>
+          </a:fontRef>
+        </p:style>
+      </p:cxnSp>
+      <p:cxnSp>
+        <p:nvCxnSpPr>
+          <p:cNvPr id="52" name="Straight Connector 51"/>
+          <p:cNvCxnSpPr/>
+          <p:nvPr/>
+        </p:nvCxnSpPr>
+        <p:spPr>
+          <a:xfrm>
+            <a:off x="6572324" y="4968981"/>
+            <a:ext cx="246465" cy="1588"/>
           </a:xfrm>
           <a:prstGeom prst="line">
             <a:avLst/>

</xml_diff>